<commit_message>
build of the python app
</commit_message>
<xml_diff>
--- a/ppt/golang/interview_questions/3/variable_declaration.pptx
+++ b/ppt/golang/interview_questions/3/variable_declaration.pptx
@@ -231,7 +231,7 @@
           <a:p>
             <a:fld id="{B21AEC72-4408-4B3D-9020-B3551AA7C39F}" type="datetimeFigureOut">
               <a:rPr lang="en-US" smtClean="0"/>
-              <a:t>4/8/2025</a:t>
+              <a:t>4/21/2025</a:t>
             </a:fld>
             <a:endParaRPr lang="en-US"/>
           </a:p>
@@ -1911,7 +1911,7 @@
           <a:p>
             <a:fld id="{5BCAD085-E8A6-8845-BD4E-CB4CCA059FC4}" type="datetimeFigureOut">
               <a:rPr lang="en-US" smtClean="0"/>
-              <a:t>4/8/2025</a:t>
+              <a:t>4/21/2025</a:t>
             </a:fld>
             <a:endParaRPr lang="en-US"/>
           </a:p>
@@ -2235,7 +2235,7 @@
           <a:p>
             <a:fld id="{5BCAD085-E8A6-8845-BD4E-CB4CCA059FC4}" type="datetimeFigureOut">
               <a:rPr lang="en-US" smtClean="0"/>
-              <a:t>4/8/2025</a:t>
+              <a:t>4/21/2025</a:t>
             </a:fld>
             <a:endParaRPr lang="en-US"/>
           </a:p>
@@ -2483,7 +2483,7 @@
           <a:p>
             <a:fld id="{5BCAD085-E8A6-8845-BD4E-CB4CCA059FC4}" type="datetimeFigureOut">
               <a:rPr lang="en-US" smtClean="0"/>
-              <a:t>4/8/2025</a:t>
+              <a:t>4/21/2025</a:t>
             </a:fld>
             <a:endParaRPr lang="en-US"/>
           </a:p>
@@ -2822,7 +2822,7 @@
           <a:p>
             <a:fld id="{5BCAD085-E8A6-8845-BD4E-CB4CCA059FC4}" type="datetimeFigureOut">
               <a:rPr lang="en-US" smtClean="0"/>
-              <a:t>4/8/2025</a:t>
+              <a:t>4/21/2025</a:t>
             </a:fld>
             <a:endParaRPr lang="en-US"/>
           </a:p>
@@ -3169,7 +3169,7 @@
           <a:p>
             <a:fld id="{5BCAD085-E8A6-8845-BD4E-CB4CCA059FC4}" type="datetimeFigureOut">
               <a:rPr lang="en-US" smtClean="0"/>
-              <a:t>4/8/2025</a:t>
+              <a:t>4/21/2025</a:t>
             </a:fld>
             <a:endParaRPr lang="en-US"/>
           </a:p>
@@ -3543,7 +3543,7 @@
           <a:p>
             <a:fld id="{5BCAD085-E8A6-8845-BD4E-CB4CCA059FC4}" type="datetimeFigureOut">
               <a:rPr lang="en-US" smtClean="0"/>
-              <a:t>4/8/2025</a:t>
+              <a:t>4/21/2025</a:t>
             </a:fld>
             <a:endParaRPr lang="en-US"/>
           </a:p>
@@ -4013,7 +4013,7 @@
           <a:p>
             <a:fld id="{5BCAD085-E8A6-8845-BD4E-CB4CCA059FC4}" type="datetimeFigureOut">
               <a:rPr lang="en-US" smtClean="0"/>
-              <a:t>4/8/2025</a:t>
+              <a:t>4/21/2025</a:t>
             </a:fld>
             <a:endParaRPr lang="en-US"/>
           </a:p>
@@ -4218,7 +4218,7 @@
           <a:p>
             <a:fld id="{5BCAD085-E8A6-8845-BD4E-CB4CCA059FC4}" type="datetimeFigureOut">
               <a:rPr lang="en-US" smtClean="0"/>
-              <a:t>4/8/2025</a:t>
+              <a:t>4/21/2025</a:t>
             </a:fld>
             <a:endParaRPr lang="en-US"/>
           </a:p>
@@ -4429,7 +4429,7 @@
           <a:p>
             <a:fld id="{5BCAD085-E8A6-8845-BD4E-CB4CCA059FC4}" type="datetimeFigureOut">
               <a:rPr lang="en-US" smtClean="0"/>
-              <a:t>4/8/2025</a:t>
+              <a:t>4/21/2025</a:t>
             </a:fld>
             <a:endParaRPr lang="en-US"/>
           </a:p>
@@ -4661,7 +4661,7 @@
           <a:p>
             <a:fld id="{5BCAD085-E8A6-8845-BD4E-CB4CCA059FC4}" type="datetimeFigureOut">
               <a:rPr lang="en-US" smtClean="0"/>
-              <a:t>4/8/2025</a:t>
+              <a:t>4/21/2025</a:t>
             </a:fld>
             <a:endParaRPr lang="en-US"/>
           </a:p>
@@ -4909,7 +4909,7 @@
           <a:p>
             <a:fld id="{5BCAD085-E8A6-8845-BD4E-CB4CCA059FC4}" type="datetimeFigureOut">
               <a:rPr lang="en-US" smtClean="0"/>
-              <a:t>4/8/2025</a:t>
+              <a:t>4/21/2025</a:t>
             </a:fld>
             <a:endParaRPr lang="en-US"/>
           </a:p>
@@ -5207,7 +5207,7 @@
           <a:p>
             <a:fld id="{5BCAD085-E8A6-8845-BD4E-CB4CCA059FC4}" type="datetimeFigureOut">
               <a:rPr lang="en-US" smtClean="0"/>
-              <a:t>4/8/2025</a:t>
+              <a:t>4/21/2025</a:t>
             </a:fld>
             <a:endParaRPr lang="en-US"/>
           </a:p>
@@ -5601,7 +5601,7 @@
           <a:p>
             <a:fld id="{5BCAD085-E8A6-8845-BD4E-CB4CCA059FC4}" type="datetimeFigureOut">
               <a:rPr lang="en-US" smtClean="0"/>
-              <a:t>4/8/2025</a:t>
+              <a:t>4/21/2025</a:t>
             </a:fld>
             <a:endParaRPr lang="en-US"/>
           </a:p>
@@ -5750,7 +5750,7 @@
           <a:p>
             <a:fld id="{5BCAD085-E8A6-8845-BD4E-CB4CCA059FC4}" type="datetimeFigureOut">
               <a:rPr lang="en-US" smtClean="0"/>
-              <a:t>4/8/2025</a:t>
+              <a:t>4/21/2025</a:t>
             </a:fld>
             <a:endParaRPr lang="en-US"/>
           </a:p>
@@ -5876,7 +5876,7 @@
           <a:p>
             <a:fld id="{5BCAD085-E8A6-8845-BD4E-CB4CCA059FC4}" type="datetimeFigureOut">
               <a:rPr lang="en-US" smtClean="0"/>
-              <a:t>4/8/2025</a:t>
+              <a:t>4/21/2025</a:t>
             </a:fld>
             <a:endParaRPr lang="en-US"/>
           </a:p>
@@ -6131,7 +6131,7 @@
           <a:p>
             <a:fld id="{5BCAD085-E8A6-8845-BD4E-CB4CCA059FC4}" type="datetimeFigureOut">
               <a:rPr lang="en-US" smtClean="0"/>
-              <a:t>4/8/2025</a:t>
+              <a:t>4/21/2025</a:t>
             </a:fld>
             <a:endParaRPr lang="en-US"/>
           </a:p>
@@ -6446,7 +6446,7 @@
           <a:p>
             <a:fld id="{5BCAD085-E8A6-8845-BD4E-CB4CCA059FC4}" type="datetimeFigureOut">
               <a:rPr lang="en-US" smtClean="0"/>
-              <a:t>4/8/2025</a:t>
+              <a:t>4/21/2025</a:t>
             </a:fld>
             <a:endParaRPr lang="en-US"/>
           </a:p>
@@ -6797,7 +6797,7 @@
           <a:p>
             <a:fld id="{5BCAD085-E8A6-8845-BD4E-CB4CCA059FC4}" type="datetimeFigureOut">
               <a:rPr lang="en-US" smtClean="0"/>
-              <a:t>4/8/2025</a:t>
+              <a:t>4/21/2025</a:t>
             </a:fld>
             <a:endParaRPr lang="en-US"/>
           </a:p>
@@ -7391,7 +7391,7 @@
             </a:pPr>
             <a:r>
               <a:rPr lang="en-US" sz="2800" dirty="0"/>
-              <a:t>Golang Interview Question - 3</a:t>
+              <a:t>Golang Interview Question </a:t>
             </a:r>
             <a:endParaRPr lang="en-US" sz="2800" b="0" dirty="0">
               <a:solidFill>
@@ -9853,6 +9853,7 @@
           <a:lstStyle/>
           <a:p>
             <a:r>
+              <a:rPr dirty="0"/>
               <a:t>Type Inference</a:t>
             </a:r>
           </a:p>
@@ -9870,11 +9871,10 @@
         </p:nvSpPr>
         <p:spPr/>
         <p:txBody>
-          <a:bodyPr wrap="square"/>
-          <a:lstStyle/>
-          <a:p>
-            <a:endParaRPr/>
-          </a:p>
+          <a:bodyPr wrap="square">
+            <a:normAutofit/>
+          </a:bodyPr>
+          <a:lstStyle/>
           <a:p>
             <a:pPr>
               <a:defRPr sz="1800">
@@ -9884,6 +9884,7 @@
               </a:defRPr>
             </a:pPr>
             <a:r>
+              <a:rPr sz="2400" dirty="0"/>
               <a:t>Go supports type inference, which means the compiler can automatically determine the type of a variable based on the assigned value. This allows you to write less code while keeping it strongly typed. It is especially useful in scenarios where the type is obvious from the context, improving code readability and developer efficiency.</a:t>
             </a:r>
           </a:p>

</xml_diff>

<commit_message>
new prompts are added here.
</commit_message>
<xml_diff>
--- a/ppt/golang/interview_questions/3/variable_declaration.pptx
+++ b/ppt/golang/interview_questions/3/variable_declaration.pptx
@@ -231,7 +231,7 @@
           <a:p>
             <a:fld id="{B21AEC72-4408-4B3D-9020-B3551AA7C39F}" type="datetimeFigureOut">
               <a:rPr lang="en-US" smtClean="0"/>
-              <a:t>4/21/2025</a:t>
+              <a:t>4/23/2025</a:t>
             </a:fld>
             <a:endParaRPr lang="en-US"/>
           </a:p>
@@ -1911,7 +1911,7 @@
           <a:p>
             <a:fld id="{5BCAD085-E8A6-8845-BD4E-CB4CCA059FC4}" type="datetimeFigureOut">
               <a:rPr lang="en-US" smtClean="0"/>
-              <a:t>4/21/2025</a:t>
+              <a:t>4/23/2025</a:t>
             </a:fld>
             <a:endParaRPr lang="en-US"/>
           </a:p>
@@ -2235,7 +2235,7 @@
           <a:p>
             <a:fld id="{5BCAD085-E8A6-8845-BD4E-CB4CCA059FC4}" type="datetimeFigureOut">
               <a:rPr lang="en-US" smtClean="0"/>
-              <a:t>4/21/2025</a:t>
+              <a:t>4/23/2025</a:t>
             </a:fld>
             <a:endParaRPr lang="en-US"/>
           </a:p>
@@ -2483,7 +2483,7 @@
           <a:p>
             <a:fld id="{5BCAD085-E8A6-8845-BD4E-CB4CCA059FC4}" type="datetimeFigureOut">
               <a:rPr lang="en-US" smtClean="0"/>
-              <a:t>4/21/2025</a:t>
+              <a:t>4/23/2025</a:t>
             </a:fld>
             <a:endParaRPr lang="en-US"/>
           </a:p>
@@ -2822,7 +2822,7 @@
           <a:p>
             <a:fld id="{5BCAD085-E8A6-8845-BD4E-CB4CCA059FC4}" type="datetimeFigureOut">
               <a:rPr lang="en-US" smtClean="0"/>
-              <a:t>4/21/2025</a:t>
+              <a:t>4/23/2025</a:t>
             </a:fld>
             <a:endParaRPr lang="en-US"/>
           </a:p>
@@ -3169,7 +3169,7 @@
           <a:p>
             <a:fld id="{5BCAD085-E8A6-8845-BD4E-CB4CCA059FC4}" type="datetimeFigureOut">
               <a:rPr lang="en-US" smtClean="0"/>
-              <a:t>4/21/2025</a:t>
+              <a:t>4/23/2025</a:t>
             </a:fld>
             <a:endParaRPr lang="en-US"/>
           </a:p>
@@ -3543,7 +3543,7 @@
           <a:p>
             <a:fld id="{5BCAD085-E8A6-8845-BD4E-CB4CCA059FC4}" type="datetimeFigureOut">
               <a:rPr lang="en-US" smtClean="0"/>
-              <a:t>4/21/2025</a:t>
+              <a:t>4/23/2025</a:t>
             </a:fld>
             <a:endParaRPr lang="en-US"/>
           </a:p>
@@ -4013,7 +4013,7 @@
           <a:p>
             <a:fld id="{5BCAD085-E8A6-8845-BD4E-CB4CCA059FC4}" type="datetimeFigureOut">
               <a:rPr lang="en-US" smtClean="0"/>
-              <a:t>4/21/2025</a:t>
+              <a:t>4/23/2025</a:t>
             </a:fld>
             <a:endParaRPr lang="en-US"/>
           </a:p>
@@ -4218,7 +4218,7 @@
           <a:p>
             <a:fld id="{5BCAD085-E8A6-8845-BD4E-CB4CCA059FC4}" type="datetimeFigureOut">
               <a:rPr lang="en-US" smtClean="0"/>
-              <a:t>4/21/2025</a:t>
+              <a:t>4/23/2025</a:t>
             </a:fld>
             <a:endParaRPr lang="en-US"/>
           </a:p>
@@ -4429,7 +4429,7 @@
           <a:p>
             <a:fld id="{5BCAD085-E8A6-8845-BD4E-CB4CCA059FC4}" type="datetimeFigureOut">
               <a:rPr lang="en-US" smtClean="0"/>
-              <a:t>4/21/2025</a:t>
+              <a:t>4/23/2025</a:t>
             </a:fld>
             <a:endParaRPr lang="en-US"/>
           </a:p>
@@ -4661,7 +4661,7 @@
           <a:p>
             <a:fld id="{5BCAD085-E8A6-8845-BD4E-CB4CCA059FC4}" type="datetimeFigureOut">
               <a:rPr lang="en-US" smtClean="0"/>
-              <a:t>4/21/2025</a:t>
+              <a:t>4/23/2025</a:t>
             </a:fld>
             <a:endParaRPr lang="en-US"/>
           </a:p>
@@ -4909,7 +4909,7 @@
           <a:p>
             <a:fld id="{5BCAD085-E8A6-8845-BD4E-CB4CCA059FC4}" type="datetimeFigureOut">
               <a:rPr lang="en-US" smtClean="0"/>
-              <a:t>4/21/2025</a:t>
+              <a:t>4/23/2025</a:t>
             </a:fld>
             <a:endParaRPr lang="en-US"/>
           </a:p>
@@ -5207,7 +5207,7 @@
           <a:p>
             <a:fld id="{5BCAD085-E8A6-8845-BD4E-CB4CCA059FC4}" type="datetimeFigureOut">
               <a:rPr lang="en-US" smtClean="0"/>
-              <a:t>4/21/2025</a:t>
+              <a:t>4/23/2025</a:t>
             </a:fld>
             <a:endParaRPr lang="en-US"/>
           </a:p>
@@ -5601,7 +5601,7 @@
           <a:p>
             <a:fld id="{5BCAD085-E8A6-8845-BD4E-CB4CCA059FC4}" type="datetimeFigureOut">
               <a:rPr lang="en-US" smtClean="0"/>
-              <a:t>4/21/2025</a:t>
+              <a:t>4/23/2025</a:t>
             </a:fld>
             <a:endParaRPr lang="en-US"/>
           </a:p>
@@ -5750,7 +5750,7 @@
           <a:p>
             <a:fld id="{5BCAD085-E8A6-8845-BD4E-CB4CCA059FC4}" type="datetimeFigureOut">
               <a:rPr lang="en-US" smtClean="0"/>
-              <a:t>4/21/2025</a:t>
+              <a:t>4/23/2025</a:t>
             </a:fld>
             <a:endParaRPr lang="en-US"/>
           </a:p>
@@ -5876,7 +5876,7 @@
           <a:p>
             <a:fld id="{5BCAD085-E8A6-8845-BD4E-CB4CCA059FC4}" type="datetimeFigureOut">
               <a:rPr lang="en-US" smtClean="0"/>
-              <a:t>4/21/2025</a:t>
+              <a:t>4/23/2025</a:t>
             </a:fld>
             <a:endParaRPr lang="en-US"/>
           </a:p>
@@ -6131,7 +6131,7 @@
           <a:p>
             <a:fld id="{5BCAD085-E8A6-8845-BD4E-CB4CCA059FC4}" type="datetimeFigureOut">
               <a:rPr lang="en-US" smtClean="0"/>
-              <a:t>4/21/2025</a:t>
+              <a:t>4/23/2025</a:t>
             </a:fld>
             <a:endParaRPr lang="en-US"/>
           </a:p>
@@ -6446,7 +6446,7 @@
           <a:p>
             <a:fld id="{5BCAD085-E8A6-8845-BD4E-CB4CCA059FC4}" type="datetimeFigureOut">
               <a:rPr lang="en-US" smtClean="0"/>
-              <a:t>4/21/2025</a:t>
+              <a:t>4/23/2025</a:t>
             </a:fld>
             <a:endParaRPr lang="en-US"/>
           </a:p>
@@ -6797,7 +6797,7 @@
           <a:p>
             <a:fld id="{5BCAD085-E8A6-8845-BD4E-CB4CCA059FC4}" type="datetimeFigureOut">
               <a:rPr lang="en-US" smtClean="0"/>
-              <a:t>4/21/2025</a:t>
+              <a:t>4/23/2025</a:t>
             </a:fld>
             <a:endParaRPr lang="en-US"/>
           </a:p>
@@ -7557,12 +7557,20 @@
             <p:ph type="title"/>
           </p:nvPr>
         </p:nvSpPr>
-        <p:spPr/>
-        <p:txBody>
-          <a:bodyPr/>
-          <a:lstStyle/>
-          <a:p>
-            <a:r>
+        <p:spPr>
+          <a:xfrm>
+            <a:off x="971551" y="125730"/>
+            <a:ext cx="7200897" cy="977900"/>
+          </a:xfrm>
+        </p:spPr>
+        <p:txBody>
+          <a:bodyPr>
+            <a:normAutofit/>
+          </a:bodyPr>
+          <a:lstStyle/>
+          <a:p>
+            <a:r>
+              <a:rPr sz="2400" dirty="0"/>
               <a:t>Invalid Use of := Outside Function</a:t>
             </a:r>
           </a:p>
@@ -7576,8 +7584,8 @@
         </p:nvSpPr>
         <p:spPr>
           <a:xfrm>
-            <a:off x="971552" y="1910443"/>
-            <a:ext cx="7008650" cy="2062103"/>
+            <a:off x="462279" y="782320"/>
+            <a:ext cx="8219440" cy="4016484"/>
           </a:xfrm>
           <a:prstGeom prst="rect">
             <a:avLst/>
@@ -7587,57 +7595,218 @@
           </a:solidFill>
         </p:spPr>
         <p:txBody>
-          <a:bodyPr wrap="none">
+          <a:bodyPr wrap="square">
             <a:spAutoFit/>
           </a:bodyPr>
           <a:lstStyle/>
           <a:p>
-            <a:endParaRPr sz="1600" dirty="0"/>
-          </a:p>
-          <a:p>
-            <a:pPr algn="l">
-              <a:defRPr sz="2400">
+            <a:r>
+              <a:rPr lang="en-US" sz="1500" dirty="0">
                 <a:solidFill>
                   <a:srgbClr val="FFFFFF"/>
                 </a:solidFill>
                 <a:latin typeface="Courier New"/>
-              </a:defRPr>
-            </a:pPr>
-            <a:r>
-              <a:rPr sz="1600" dirty="0"/>
-              <a:t>// This will result in a compilation error:</a:t>
-            </a:r>
-            <a:br>
-              <a:rPr sz="1600" dirty="0"/>
-            </a:br>
-            <a:r>
-              <a:rPr sz="1600" dirty="0"/>
-              <a:t>username := "admin" // ❌ Not allowed outside functions</a:t>
-            </a:r>
-            <a:br>
-              <a:rPr sz="1600" dirty="0"/>
-            </a:br>
-            <a:br>
-              <a:rPr sz="1600" dirty="0"/>
-            </a:br>
-            <a:r>
-              <a:rPr sz="1600" dirty="0"/>
-              <a:t>// Correct way at package level:</a:t>
-            </a:r>
-            <a:br>
-              <a:rPr sz="1600" dirty="0"/>
-            </a:br>
-            <a:r>
-              <a:rPr sz="1600" dirty="0"/>
+              </a:rPr>
+              <a:t>package main</a:t>
+            </a:r>
+          </a:p>
+          <a:p>
+            <a:endParaRPr lang="en-US" sz="1500" dirty="0">
+              <a:solidFill>
+                <a:srgbClr val="FFFFFF"/>
+              </a:solidFill>
+              <a:latin typeface="Courier New"/>
+            </a:endParaRPr>
+          </a:p>
+          <a:p>
+            <a:r>
+              <a:rPr lang="en-US" sz="1500" dirty="0">
+                <a:solidFill>
+                  <a:srgbClr val="FFFFFF"/>
+                </a:solidFill>
+                <a:latin typeface="Courier New"/>
+              </a:rPr>
+              <a:t>// ❌ This will cause a compilation error if uncommented:</a:t>
+            </a:r>
+          </a:p>
+          <a:p>
+            <a:r>
+              <a:rPr lang="en-US" sz="1500" dirty="0">
+                <a:solidFill>
+                  <a:srgbClr val="FFFFFF"/>
+                </a:solidFill>
+                <a:latin typeface="Courier New"/>
+              </a:rPr>
+              <a:t>// username := "admin" // Invalid use of short declaration outside a function</a:t>
+            </a:r>
+          </a:p>
+          <a:p>
+            <a:endParaRPr lang="en-US" sz="1500" dirty="0">
+              <a:solidFill>
+                <a:srgbClr val="FFFFFF"/>
+              </a:solidFill>
+              <a:latin typeface="Courier New"/>
+            </a:endParaRPr>
+          </a:p>
+          <a:p>
+            <a:r>
+              <a:rPr lang="en-US" sz="1500" dirty="0">
+                <a:solidFill>
+                  <a:srgbClr val="FFFFFF"/>
+                </a:solidFill>
+                <a:latin typeface="Courier New"/>
+              </a:rPr>
+              <a:t>// ✅ Correct way to declare a variable at the package level</a:t>
+            </a:r>
+          </a:p>
+          <a:p>
+            <a:r>
+              <a:rPr lang="en-US" sz="1500" dirty="0">
+                <a:solidFill>
+                  <a:srgbClr val="FFFFFF"/>
+                </a:solidFill>
+                <a:latin typeface="Courier New"/>
+              </a:rPr>
               <a:t>var username = "admin"</a:t>
             </a:r>
-            <a:br>
-              <a:rPr sz="1600" dirty="0"/>
-            </a:br>
-            <a:br>
-              <a:rPr sz="1600" dirty="0"/>
-            </a:br>
-            <a:endParaRPr sz="1600" dirty="0"/>
+          </a:p>
+          <a:p>
+            <a:endParaRPr lang="en-US" sz="1500" dirty="0">
+              <a:solidFill>
+                <a:srgbClr val="FFFFFF"/>
+              </a:solidFill>
+              <a:latin typeface="Courier New"/>
+            </a:endParaRPr>
+          </a:p>
+          <a:p>
+            <a:r>
+              <a:rPr lang="en-US" sz="1500" dirty="0" err="1">
+                <a:solidFill>
+                  <a:srgbClr val="FFFFFF"/>
+                </a:solidFill>
+                <a:latin typeface="Courier New"/>
+              </a:rPr>
+              <a:t>func</a:t>
+            </a:r>
+            <a:r>
+              <a:rPr lang="en-US" sz="1500" dirty="0">
+                <a:solidFill>
+                  <a:srgbClr val="FFFFFF"/>
+                </a:solidFill>
+                <a:latin typeface="Courier New"/>
+              </a:rPr>
+              <a:t> main() {</a:t>
+            </a:r>
+          </a:p>
+          <a:p>
+            <a:r>
+              <a:rPr lang="en-US" sz="1500" dirty="0">
+                <a:solidFill>
+                  <a:srgbClr val="FFFFFF"/>
+                </a:solidFill>
+                <a:latin typeface="Courier New"/>
+              </a:rPr>
+              <a:t>    // ✅ Short declaration is allowed inside a function</a:t>
+            </a:r>
+          </a:p>
+          <a:p>
+            <a:r>
+              <a:rPr lang="en-US" sz="1500" dirty="0">
+                <a:solidFill>
+                  <a:srgbClr val="FFFFFF"/>
+                </a:solidFill>
+                <a:latin typeface="Courier New"/>
+              </a:rPr>
+              <a:t>    password := "secret"</a:t>
+            </a:r>
+          </a:p>
+          <a:p>
+            <a:endParaRPr lang="en-US" sz="1500" dirty="0">
+              <a:solidFill>
+                <a:srgbClr val="FFFFFF"/>
+              </a:solidFill>
+              <a:latin typeface="Courier New"/>
+            </a:endParaRPr>
+          </a:p>
+          <a:p>
+            <a:r>
+              <a:rPr lang="en-US" sz="1500" dirty="0">
+                <a:solidFill>
+                  <a:srgbClr val="FFFFFF"/>
+                </a:solidFill>
+                <a:latin typeface="Courier New"/>
+              </a:rPr>
+              <a:t>    // Print the variables</a:t>
+            </a:r>
+          </a:p>
+          <a:p>
+            <a:r>
+              <a:rPr lang="en-US" sz="1500" dirty="0">
+                <a:solidFill>
+                  <a:srgbClr val="FFFFFF"/>
+                </a:solidFill>
+                <a:latin typeface="Courier New"/>
+              </a:rPr>
+              <a:t>    </a:t>
+            </a:r>
+            <a:r>
+              <a:rPr lang="en-US" sz="1500" dirty="0" err="1">
+                <a:solidFill>
+                  <a:srgbClr val="FFFFFF"/>
+                </a:solidFill>
+                <a:latin typeface="Courier New"/>
+              </a:rPr>
+              <a:t>println</a:t>
+            </a:r>
+            <a:r>
+              <a:rPr lang="en-US" sz="1500" dirty="0">
+                <a:solidFill>
+                  <a:srgbClr val="FFFFFF"/>
+                </a:solidFill>
+                <a:latin typeface="Courier New"/>
+              </a:rPr>
+              <a:t>("Username:", username)</a:t>
+            </a:r>
+          </a:p>
+          <a:p>
+            <a:r>
+              <a:rPr lang="en-US" sz="1500" dirty="0">
+                <a:solidFill>
+                  <a:srgbClr val="FFFFFF"/>
+                </a:solidFill>
+                <a:latin typeface="Courier New"/>
+              </a:rPr>
+              <a:t>    </a:t>
+            </a:r>
+            <a:r>
+              <a:rPr lang="en-US" sz="1500" dirty="0" err="1">
+                <a:solidFill>
+                  <a:srgbClr val="FFFFFF"/>
+                </a:solidFill>
+                <a:latin typeface="Courier New"/>
+              </a:rPr>
+              <a:t>println</a:t>
+            </a:r>
+            <a:r>
+              <a:rPr lang="en-US" sz="1500" dirty="0">
+                <a:solidFill>
+                  <a:srgbClr val="FFFFFF"/>
+                </a:solidFill>
+                <a:latin typeface="Courier New"/>
+              </a:rPr>
+              <a:t>("Password:", password)</a:t>
+            </a:r>
+          </a:p>
+          <a:p>
+            <a:r>
+              <a:rPr lang="en-US" sz="1500" dirty="0">
+                <a:solidFill>
+                  <a:srgbClr val="FFFFFF"/>
+                </a:solidFill>
+                <a:latin typeface="Courier New"/>
+              </a:rPr>
+              <a:t>}</a:t>
+            </a:r>
           </a:p>
         </p:txBody>
       </p:sp>
@@ -7682,6 +7851,7 @@
           <a:lstStyle/>
           <a:p>
             <a:r>
+              <a:rPr dirty="0"/>
               <a:t>Multiple Variable Declaration</a:t>
             </a:r>
           </a:p>
@@ -7699,11 +7869,10 @@
         </p:nvSpPr>
         <p:spPr/>
         <p:txBody>
-          <a:bodyPr wrap="square"/>
-          <a:lstStyle/>
-          <a:p>
-            <a:endParaRPr/>
-          </a:p>
+          <a:bodyPr wrap="square">
+            <a:noAutofit/>
+          </a:bodyPr>
+          <a:lstStyle/>
           <a:p>
             <a:pPr>
               <a:defRPr sz="1800">
@@ -7713,8 +7882,40 @@
               </a:defRPr>
             </a:pPr>
             <a:r>
+              <a:rPr sz="2500" dirty="0"/>
               <a:t>Go allows declaring multiple variables in a single line or in a grouped declaration block. This helps organize code better, especially when initializing related variables together. Grouped declarations improve code readability and reduce redundancy, particularly in cases where the variables share the same type or purpose.</a:t>
             </a:r>
+            <a:endParaRPr lang="en-US" sz="2500" dirty="0"/>
+          </a:p>
+          <a:p>
+            <a:pPr>
+              <a:defRPr sz="1800">
+                <a:solidFill>
+                  <a:srgbClr val="000000"/>
+                </a:solidFill>
+              </a:defRPr>
+            </a:pPr>
+            <a:endParaRPr lang="en-IN" sz="2500" dirty="0"/>
+          </a:p>
+          <a:p>
+            <a:pPr>
+              <a:defRPr sz="1800">
+                <a:solidFill>
+                  <a:srgbClr val="000000"/>
+                </a:solidFill>
+              </a:defRPr>
+            </a:pPr>
+            <a:endParaRPr lang="en-IN" sz="2500" dirty="0"/>
+          </a:p>
+          <a:p>
+            <a:pPr>
+              <a:defRPr sz="1800">
+                <a:solidFill>
+                  <a:srgbClr val="000000"/>
+                </a:solidFill>
+              </a:defRPr>
+            </a:pPr>
+            <a:endParaRPr sz="2500" dirty="0"/>
           </a:p>
         </p:txBody>
       </p:sp>
@@ -7999,6 +8200,7 @@
           <a:lstStyle/>
           <a:p>
             <a:r>
+              <a:rPr dirty="0"/>
               <a:t>Zero Values in Go</a:t>
             </a:r>
           </a:p>
@@ -8016,11 +8218,10 @@
         </p:nvSpPr>
         <p:spPr/>
         <p:txBody>
-          <a:bodyPr wrap="square"/>
-          <a:lstStyle/>
-          <a:p>
-            <a:endParaRPr/>
-          </a:p>
+          <a:bodyPr wrap="square">
+            <a:noAutofit/>
+          </a:bodyPr>
+          <a:lstStyle/>
           <a:p>
             <a:pPr>
               <a:defRPr sz="1800">
@@ -8030,8 +8231,32 @@
               </a:defRPr>
             </a:pPr>
             <a:r>
-              <a:t>When a variable is declared in Go but not initialized, it is automatically given a zero value. The zero value depends on the variable’s type: numeric types default to 0, booleans to false, strings to an empty string, and pointers (or interfaces) to nil. Understanding zero values is essential to avoid unexpected behavior in your programs.</a:t>
-            </a:r>
+              <a:rPr lang="en-IN" sz="2400" dirty="0"/>
+              <a:t>Example - var age int</a:t>
+            </a:r>
+            <a:endParaRPr lang="en-US" sz="2400" dirty="0"/>
+          </a:p>
+          <a:p>
+            <a:pPr>
+              <a:defRPr sz="1800">
+                <a:solidFill>
+                  <a:srgbClr val="000000"/>
+                </a:solidFill>
+              </a:defRPr>
+            </a:pPr>
+            <a:r>
+              <a:rPr sz="2400" dirty="0"/>
+              <a:t>When a variable is declared in Go but not initialized, it is automatically given a zero value. The zero value depends on the variable’s type: numeric types default to 0, </a:t>
+            </a:r>
+            <a:r>
+              <a:rPr sz="2400" dirty="0" err="1"/>
+              <a:t>booleans</a:t>
+            </a:r>
+            <a:r>
+              <a:rPr sz="2400" dirty="0"/>
+              <a:t> to false, strings to an empty string, and pointers (or interfaces) to nil. Understanding zero values is essential to avoid unexpected behavior in your programs.</a:t>
+            </a:r>
+            <a:endParaRPr lang="en-US" sz="2400" dirty="0"/>
           </a:p>
         </p:txBody>
       </p:sp>
@@ -8491,13 +8716,17 @@
             <p:ph idx="1"/>
           </p:nvPr>
         </p:nvSpPr>
-        <p:spPr/>
-        <p:txBody>
-          <a:bodyPr wrap="square"/>
-          <a:lstStyle/>
-          <a:p>
-            <a:endParaRPr/>
-          </a:p>
+        <p:spPr>
+          <a:xfrm>
+            <a:off x="892304" y="1826259"/>
+            <a:ext cx="7200897" cy="2489202"/>
+          </a:xfrm>
+        </p:spPr>
+        <p:txBody>
+          <a:bodyPr wrap="square">
+            <a:noAutofit/>
+          </a:bodyPr>
+          <a:lstStyle/>
           <a:p>
             <a:pPr>
               <a:defRPr sz="1800">
@@ -8507,6 +8736,7 @@
               </a:defRPr>
             </a:pPr>
             <a:r>
+              <a:rPr sz="2500" dirty="0"/>
               <a:t>Constants are immutable values declared using the `const` keyword. Unlike variables, constants cannot be reassigned after declaration. They are evaluated at compile time and are often used for fixed configuration values such as Pi, status codes, or application versioning. Constants also help in optimizing performance and code clarity.</a:t>
             </a:r>
           </a:p>
@@ -8752,11 +8982,10 @@
         </p:nvSpPr>
         <p:spPr/>
         <p:txBody>
-          <a:bodyPr wrap="square"/>
-          <a:lstStyle/>
-          <a:p>
-            <a:endParaRPr/>
-          </a:p>
+          <a:bodyPr wrap="square">
+            <a:noAutofit/>
+          </a:bodyPr>
+          <a:lstStyle/>
           <a:p>
             <a:pPr>
               <a:defRPr sz="1800">
@@ -8766,6 +8995,7 @@
               </a:defRPr>
             </a:pPr>
             <a:r>
+              <a:rPr sz="2200" dirty="0"/>
               <a:t>The scope of a variable determines where it can be accessed in the code. In Go, variables can be local (inside a function), or package-level (outside any function but within a package). Go does not have traditional global variables accessible across packages; instead, exported variables (starting with a capital letter) can be accessed from other packages. Proper scoping ensures better encapsulation, memory management, and code structure.</a:t>
             </a:r>
           </a:p>
@@ -8830,12 +9060,9 @@
         <p:spPr/>
         <p:txBody>
           <a:bodyPr wrap="square">
-            <a:normAutofit fontScale="85000" lnSpcReduction="10000"/>
+            <a:noAutofit/>
           </a:bodyPr>
           <a:lstStyle/>
-          <a:p>
-            <a:endParaRPr/>
-          </a:p>
           <a:p>
             <a:pPr>
               <a:defRPr sz="1800">
@@ -8845,6 +9072,7 @@
               </a:defRPr>
             </a:pPr>
             <a:r>
+              <a:rPr dirty="0"/>
               <a:t>- Prefer short declarations (`:=`) when working within functions for cleaner and more concise code.</a:t>
             </a:r>
           </a:p>
@@ -8857,6 +9085,7 @@
               </a:defRPr>
             </a:pPr>
             <a:r>
+              <a:rPr dirty="0"/>
               <a:t>- Declare variables close to where they are used to improve readability and maintainability.</a:t>
             </a:r>
           </a:p>
@@ -8869,6 +9098,7 @@
               </a:defRPr>
             </a:pPr>
             <a:r>
+              <a:rPr dirty="0"/>
               <a:t>- Avoid declaring unused variables, as Go treats them as compilation errors.</a:t>
             </a:r>
           </a:p>
@@ -8881,6 +9111,7 @@
               </a:defRPr>
             </a:pPr>
             <a:r>
+              <a:rPr dirty="0"/>
               <a:t>- Use clear and descriptive names that convey the purpose of the variable.</a:t>
             </a:r>
           </a:p>
@@ -8893,6 +9124,7 @@
               </a:defRPr>
             </a:pPr>
             <a:r>
+              <a:rPr dirty="0"/>
               <a:t>- Group logically related variable declarations together, especially when they share a common purpose or data type.</a:t>
             </a:r>
           </a:p>
@@ -10047,11 +10279,10 @@
         </p:nvSpPr>
         <p:spPr/>
         <p:txBody>
-          <a:bodyPr wrap="square"/>
-          <a:lstStyle/>
-          <a:p>
-            <a:endParaRPr/>
-          </a:p>
+          <a:bodyPr wrap="square">
+            <a:noAutofit/>
+          </a:bodyPr>
+          <a:lstStyle/>
           <a:p>
             <a:pPr>
               <a:defRPr sz="1800">
@@ -10061,6 +10292,7 @@
               </a:defRPr>
             </a:pPr>
             <a:r>
+              <a:rPr sz="2400" dirty="0"/>
               <a:t>Short variable declaration using `:=` is the most concise way to declare and initialize variables in Go. It is only allowed within function bodies and cannot be used at the package level. This form is extremely useful for quick assignments and is commonly seen in idiomatic Go code. However, you must be careful with redeclarations in the same scope.</a:t>
             </a:r>
           </a:p>

</xml_diff>